<commit_message>
updated dev lifecycle diagram
</commit_message>
<xml_diff>
--- a/docs/Telemetry-App Development Lifecycle Strategy Diagram.pptx
+++ b/docs/Telemetry-App Development Lifecycle Strategy Diagram.pptx
@@ -104,6 +104,11 @@
       </a:defRPr>
     </a:lvl9pPr>
   </p:defaultTextStyle>
+  <p:extLst>
+    <p:ext uri="{EFAFB233-063F-42B5-8137-9DF3F51BA10A}">
+      <p15:sldGuideLst xmlns:p15="http://schemas.microsoft.com/office/powerpoint/2012/main"/>
+    </p:ext>
+  </p:extLst>
 </p:presentation>
 </file>
 
@@ -5337,6 +5342,283 @@
           </a:p>
         </p:txBody>
       </p:sp>
+      <p:grpSp>
+        <p:nvGrpSpPr>
+          <p:cNvPr id="6" name="Group 5">
+            <a:extLst>
+              <a:ext uri="{FF2B5EF4-FFF2-40B4-BE49-F238E27FC236}">
+                <a16:creationId xmlns:a16="http://schemas.microsoft.com/office/drawing/2014/main" id="{BEA58113-C221-47FC-90C9-C2AA68DC52BF}"/>
+              </a:ext>
+            </a:extLst>
+          </p:cNvPr>
+          <p:cNvGrpSpPr/>
+          <p:nvPr/>
+        </p:nvGrpSpPr>
+        <p:grpSpPr>
+          <a:xfrm>
+            <a:off x="9629910" y="801153"/>
+            <a:ext cx="2196954" cy="1092470"/>
+            <a:chOff x="9629910" y="801153"/>
+            <a:chExt cx="2196954" cy="1092470"/>
+          </a:xfrm>
+        </p:grpSpPr>
+        <p:grpSp>
+          <p:nvGrpSpPr>
+            <p:cNvPr id="3" name="Group 2">
+              <a:extLst>
+                <a:ext uri="{FF2B5EF4-FFF2-40B4-BE49-F238E27FC236}">
+                  <a16:creationId xmlns:a16="http://schemas.microsoft.com/office/drawing/2014/main" id="{F29A6B2C-D835-4407-8D46-BC0CCC0F95ED}"/>
+                </a:ext>
+              </a:extLst>
+            </p:cNvPr>
+            <p:cNvGrpSpPr/>
+            <p:nvPr/>
+          </p:nvGrpSpPr>
+          <p:grpSpPr>
+            <a:xfrm>
+              <a:off x="9787125" y="932224"/>
+              <a:ext cx="1954056" cy="430887"/>
+              <a:chOff x="9787125" y="932224"/>
+              <a:chExt cx="1954056" cy="430887"/>
+            </a:xfrm>
+          </p:grpSpPr>
+          <p:sp>
+            <p:nvSpPr>
+              <p:cNvPr id="47" name="Flowchart: Alternate Process 46">
+                <a:extLst>
+                  <a:ext uri="{FF2B5EF4-FFF2-40B4-BE49-F238E27FC236}">
+                    <a16:creationId xmlns:a16="http://schemas.microsoft.com/office/drawing/2014/main" id="{FC6B85FE-DD1B-456B-969B-933FCB581E4B}"/>
+                  </a:ext>
+                </a:extLst>
+              </p:cNvPr>
+              <p:cNvSpPr/>
+              <p:nvPr/>
+            </p:nvSpPr>
+            <p:spPr>
+              <a:xfrm>
+                <a:off x="9787125" y="1009169"/>
+                <a:ext cx="850416" cy="276999"/>
+              </a:xfrm>
+              <a:prstGeom prst="flowChartAlternateProcess">
+                <a:avLst/>
+              </a:prstGeom>
+            </p:spPr>
+            <p:style>
+              <a:lnRef idx="1">
+                <a:schemeClr val="accent6"/>
+              </a:lnRef>
+              <a:fillRef idx="2">
+                <a:schemeClr val="accent6"/>
+              </a:fillRef>
+              <a:effectRef idx="1">
+                <a:schemeClr val="accent6"/>
+              </a:effectRef>
+              <a:fontRef idx="minor">
+                <a:schemeClr val="dk1"/>
+              </a:fontRef>
+            </p:style>
+            <p:txBody>
+              <a:bodyPr rtlCol="0" anchor="ctr"/>
+              <a:lstStyle/>
+              <a:p>
+                <a:pPr algn="ctr"/>
+                <a:endParaRPr lang="en-IE" sz="1200" dirty="0"/>
+              </a:p>
+            </p:txBody>
+          </p:sp>
+          <p:sp>
+            <p:nvSpPr>
+              <p:cNvPr id="2" name="TextBox 1">
+                <a:extLst>
+                  <a:ext uri="{FF2B5EF4-FFF2-40B4-BE49-F238E27FC236}">
+                    <a16:creationId xmlns:a16="http://schemas.microsoft.com/office/drawing/2014/main" id="{123738D1-BEE5-44C5-8503-AE9CE6D1200D}"/>
+                  </a:ext>
+                </a:extLst>
+              </p:cNvPr>
+              <p:cNvSpPr txBox="1"/>
+              <p:nvPr/>
+            </p:nvSpPr>
+            <p:spPr>
+              <a:xfrm>
+                <a:off x="10757770" y="932224"/>
+                <a:ext cx="983411" cy="430887"/>
+              </a:xfrm>
+              <a:prstGeom prst="rect">
+                <a:avLst/>
+              </a:prstGeom>
+              <a:noFill/>
+            </p:spPr>
+            <p:txBody>
+              <a:bodyPr wrap="square" rtlCol="0">
+                <a:spAutoFit/>
+              </a:bodyPr>
+              <a:lstStyle/>
+              <a:p>
+                <a:r>
+                  <a:rPr lang="en-GB" sz="1100" dirty="0"/>
+                  <a:t>Automated process</a:t>
+                </a:r>
+                <a:endParaRPr lang="en-IE" sz="1100" dirty="0"/>
+              </a:p>
+            </p:txBody>
+          </p:sp>
+        </p:grpSp>
+        <p:grpSp>
+          <p:nvGrpSpPr>
+            <p:cNvPr id="5" name="Group 4">
+              <a:extLst>
+                <a:ext uri="{FF2B5EF4-FFF2-40B4-BE49-F238E27FC236}">
+                  <a16:creationId xmlns:a16="http://schemas.microsoft.com/office/drawing/2014/main" id="{E8C31295-5DCC-4CDD-9ADD-8F9931CD9D8A}"/>
+                </a:ext>
+              </a:extLst>
+            </p:cNvPr>
+            <p:cNvGrpSpPr/>
+            <p:nvPr/>
+          </p:nvGrpSpPr>
+          <p:grpSpPr>
+            <a:xfrm>
+              <a:off x="9800237" y="1311196"/>
+              <a:ext cx="1911561" cy="430887"/>
+              <a:chOff x="9800237" y="1311196"/>
+              <a:chExt cx="1911561" cy="430887"/>
+            </a:xfrm>
+          </p:grpSpPr>
+          <p:sp>
+            <p:nvSpPr>
+              <p:cNvPr id="49" name="Flowchart: Alternate Process 48">
+                <a:extLst>
+                  <a:ext uri="{FF2B5EF4-FFF2-40B4-BE49-F238E27FC236}">
+                    <a16:creationId xmlns:a16="http://schemas.microsoft.com/office/drawing/2014/main" id="{88F53032-89F0-4633-BF57-2BC49367160C}"/>
+                  </a:ext>
+                </a:extLst>
+              </p:cNvPr>
+              <p:cNvSpPr/>
+              <p:nvPr/>
+            </p:nvSpPr>
+            <p:spPr>
+              <a:xfrm>
+                <a:off x="9800237" y="1388141"/>
+                <a:ext cx="850416" cy="276999"/>
+              </a:xfrm>
+              <a:prstGeom prst="flowChartAlternateProcess">
+                <a:avLst/>
+              </a:prstGeom>
+            </p:spPr>
+            <p:style>
+              <a:lnRef idx="1">
+                <a:schemeClr val="accent1"/>
+              </a:lnRef>
+              <a:fillRef idx="2">
+                <a:schemeClr val="accent1"/>
+              </a:fillRef>
+              <a:effectRef idx="1">
+                <a:schemeClr val="accent1"/>
+              </a:effectRef>
+              <a:fontRef idx="minor">
+                <a:schemeClr val="dk1"/>
+              </a:fontRef>
+            </p:style>
+            <p:txBody>
+              <a:bodyPr rtlCol="0" anchor="ctr"/>
+              <a:lstStyle/>
+              <a:p>
+                <a:pPr algn="ctr"/>
+                <a:endParaRPr lang="en-IE" sz="1200" dirty="0"/>
+              </a:p>
+            </p:txBody>
+          </p:sp>
+          <p:sp>
+            <p:nvSpPr>
+              <p:cNvPr id="50" name="TextBox 49">
+                <a:extLst>
+                  <a:ext uri="{FF2B5EF4-FFF2-40B4-BE49-F238E27FC236}">
+                    <a16:creationId xmlns:a16="http://schemas.microsoft.com/office/drawing/2014/main" id="{0188CB4D-810F-4639-A332-1FDFE940EE68}"/>
+                  </a:ext>
+                </a:extLst>
+              </p:cNvPr>
+              <p:cNvSpPr txBox="1"/>
+              <p:nvPr/>
+            </p:nvSpPr>
+            <p:spPr>
+              <a:xfrm>
+                <a:off x="10728387" y="1311196"/>
+                <a:ext cx="983411" cy="430887"/>
+              </a:xfrm>
+              <a:prstGeom prst="rect">
+                <a:avLst/>
+              </a:prstGeom>
+              <a:noFill/>
+            </p:spPr>
+            <p:txBody>
+              <a:bodyPr wrap="square" rtlCol="0">
+                <a:spAutoFit/>
+              </a:bodyPr>
+              <a:lstStyle/>
+              <a:p>
+                <a:r>
+                  <a:rPr lang="en-GB" sz="1100" dirty="0"/>
+                  <a:t>Manual process</a:t>
+                </a:r>
+                <a:endParaRPr lang="en-IE" sz="1100" dirty="0"/>
+              </a:p>
+            </p:txBody>
+          </p:sp>
+        </p:grpSp>
+        <p:sp>
+          <p:nvSpPr>
+            <p:cNvPr id="51" name="Rectangle 50">
+              <a:extLst>
+                <a:ext uri="{FF2B5EF4-FFF2-40B4-BE49-F238E27FC236}">
+                  <a16:creationId xmlns:a16="http://schemas.microsoft.com/office/drawing/2014/main" id="{F701CA77-E91C-402E-9935-E843F45A72D3}"/>
+                </a:ext>
+              </a:extLst>
+            </p:cNvPr>
+            <p:cNvSpPr/>
+            <p:nvPr/>
+          </p:nvSpPr>
+          <p:spPr>
+            <a:xfrm>
+              <a:off x="9629910" y="801153"/>
+              <a:ext cx="2196954" cy="1092470"/>
+            </a:xfrm>
+            <a:prstGeom prst="rect">
+              <a:avLst/>
+            </a:prstGeom>
+            <a:noFill/>
+            <a:ln w="9525" cap="flat" cmpd="sng" algn="ctr">
+              <a:solidFill>
+                <a:schemeClr val="accent1"/>
+              </a:solidFill>
+              <a:prstDash val="solid"/>
+              <a:round/>
+              <a:headEnd type="none" w="med" len="med"/>
+              <a:tailEnd type="none" w="med" len="med"/>
+            </a:ln>
+          </p:spPr>
+          <p:style>
+            <a:lnRef idx="0">
+              <a:scrgbClr r="0" g="0" b="0"/>
+            </a:lnRef>
+            <a:fillRef idx="0">
+              <a:scrgbClr r="0" g="0" b="0"/>
+            </a:fillRef>
+            <a:effectRef idx="0">
+              <a:scrgbClr r="0" g="0" b="0"/>
+            </a:effectRef>
+            <a:fontRef idx="minor">
+              <a:schemeClr val="accent1"/>
+            </a:fontRef>
+          </p:style>
+          <p:txBody>
+            <a:bodyPr rtlCol="0" anchor="ctr"/>
+            <a:lstStyle/>
+            <a:p>
+              <a:pPr algn="ctr"/>
+              <a:endParaRPr lang="en-IE"/>
+            </a:p>
+          </p:txBody>
+        </p:sp>
+      </p:grpSp>
     </p:spTree>
     <p:extLst>
       <p:ext uri="{BB962C8B-B14F-4D97-AF65-F5344CB8AC3E}">

</xml_diff>